<commit_message>
Fix typo in slide 19, thanks Linus kim
</commit_message>
<xml_diff>
--- a/lectures/Lect02_SimpRegression.pptx
+++ b/lectures/Lect02_SimpRegression.pptx
@@ -244,7 +244,7 @@
           <a:p>
             <a:fld id="{B7D6DDD3-D7E9-488B-B626-1E8285E424D8}" type="datetimeFigureOut">
               <a:rPr lang="en-US" smtClean="0"/>
-              <a:t>9/4/2018</a:t>
+              <a:t>9/24/2019</a:t>
             </a:fld>
             <a:endParaRPr lang="en-US"/>
           </a:p>
@@ -5920,8 +5920,8 @@
           </a:p>
         </p:txBody>
       </p:sp>
-      <mc:AlternateContent xmlns:mc="http://schemas.openxmlformats.org/markup-compatibility/2006">
-        <mc:Choice xmlns:a14="http://schemas.microsoft.com/office/drawing/2010/main" Requires="a14">
+      <mc:AlternateContent xmlns:mc="http://schemas.openxmlformats.org/markup-compatibility/2006" xmlns:a14="http://schemas.microsoft.com/office/drawing/2010/main">
+        <mc:Choice Requires="a14">
           <p:sp>
             <p:nvSpPr>
               <p:cNvPr id="3" name="Content Placeholder 2"/>
@@ -6657,7 +6657,7 @@
             </p:txBody>
           </p:sp>
         </mc:Choice>
-        <mc:Fallback>
+        <mc:Fallback xmlns="">
           <p:sp>
             <p:nvSpPr>
               <p:cNvPr id="3" name="Content Placeholder 2"/>
@@ -6939,8 +6939,8 @@
           </a:p>
         </p:txBody>
       </p:sp>
-      <mc:AlternateContent xmlns:mc="http://schemas.openxmlformats.org/markup-compatibility/2006">
-        <mc:Choice xmlns:a14="http://schemas.microsoft.com/office/drawing/2010/main" Requires="a14">
+      <mc:AlternateContent xmlns:mc="http://schemas.openxmlformats.org/markup-compatibility/2006" xmlns:a14="http://schemas.microsoft.com/office/drawing/2010/main">
+        <mc:Choice Requires="a14">
           <p:sp>
             <p:nvSpPr>
               <p:cNvPr id="3" name="Content Placeholder 2"/>
@@ -7401,7 +7401,7 @@
             </p:txBody>
           </p:sp>
         </mc:Choice>
-        <mc:Fallback>
+        <mc:Fallback xmlns="">
           <p:sp>
             <p:nvSpPr>
               <p:cNvPr id="3" name="Content Placeholder 2"/>
@@ -8733,8 +8733,8 @@
           </a:p>
         </p:txBody>
       </p:sp>
-      <mc:AlternateContent xmlns:mc="http://schemas.openxmlformats.org/markup-compatibility/2006" xmlns:a14="http://schemas.microsoft.com/office/drawing/2010/main">
-        <mc:Choice Requires="a14">
+      <mc:AlternateContent xmlns:mc="http://schemas.openxmlformats.org/markup-compatibility/2006">
+        <mc:Choice xmlns:a14="http://schemas.microsoft.com/office/drawing/2010/main" Requires="a14">
           <p:sp>
             <p:nvSpPr>
               <p:cNvPr id="5" name="Content Placeholder 2">
@@ -9201,31 +9201,7 @@
                       <a:rPr lang="en-US" b="0" i="1" smtClean="0">
                         <a:latin typeface="Cambria Math" panose="02040503050406030204" pitchFamily="18" charset="0"/>
                       </a:rPr>
-                      <m:t>=</m:t>
-                    </m:r>
-                    <m:r>
-                      <a:rPr lang="en-US" b="0" i="1" smtClean="0">
-                        <a:latin typeface="Cambria Math" panose="02040503050406030204" pitchFamily="18" charset="0"/>
-                      </a:rPr>
-                      <m:t>1</m:t>
-                    </m:r>
-                    <m:r>
-                      <a:rPr lang="en-US" b="0" i="1" smtClean="0">
-                        <a:latin typeface="Cambria Math" panose="02040503050406030204" pitchFamily="18" charset="0"/>
-                      </a:rPr>
-                      <m:t>,</m:t>
-                    </m:r>
-                    <m:r>
-                      <a:rPr lang="en-US" b="0" i="1" smtClean="0">
-                        <a:latin typeface="Cambria Math" panose="02040503050406030204" pitchFamily="18" charset="0"/>
-                      </a:rPr>
-                      <m:t>2</m:t>
-                    </m:r>
-                    <m:r>
-                      <a:rPr lang="en-US" b="0" i="1" smtClean="0">
-                        <a:latin typeface="Cambria Math" panose="02040503050406030204" pitchFamily="18" charset="0"/>
-                      </a:rPr>
-                      <m:t>,…,</m:t>
+                      <m:t>=1,2,…,</m:t>
                     </m:r>
                     <m:r>
                       <a:rPr lang="en-US" b="0" i="1" smtClean="0">
@@ -9410,10 +9386,10 @@
                                 </m:sub>
                               </m:sSub>
                               <m:r>
-                                <a:rPr lang="en-US" i="1">
+                                <a:rPr lang="en-US" b="0" i="1" smtClean="0">
                                   <a:latin typeface="Cambria Math" panose="02040503050406030204" pitchFamily="18" charset="0"/>
                                 </a:rPr>
-                                <m:t>+</m:t>
+                                <m:t> − </m:t>
                               </m:r>
                               <m:sSub>
                                 <m:sSubPr>
@@ -9648,7 +9624,7 @@
             </p:txBody>
           </p:sp>
         </mc:Choice>
-        <mc:Fallback xmlns="">
+        <mc:Fallback>
           <p:sp>
             <p:nvSpPr>
               <p:cNvPr id="5" name="Content Placeholder 2">
@@ -10446,8 +10422,8 @@
           </a:p>
         </p:txBody>
       </p:sp>
-      <mc:AlternateContent xmlns:mc="http://schemas.openxmlformats.org/markup-compatibility/2006">
-        <mc:Choice xmlns:a14="http://schemas.microsoft.com/office/drawing/2010/main" Requires="a14">
+      <mc:AlternateContent xmlns:mc="http://schemas.openxmlformats.org/markup-compatibility/2006" xmlns:a14="http://schemas.microsoft.com/office/drawing/2010/main">
+        <mc:Choice Requires="a14">
           <p:sp>
             <p:nvSpPr>
               <p:cNvPr id="3" name="Content Placeholder 2"/>
@@ -11346,7 +11322,7 @@
             </p:txBody>
           </p:sp>
         </mc:Choice>
-        <mc:Fallback>
+        <mc:Fallback xmlns="">
           <p:sp>
             <p:nvSpPr>
               <p:cNvPr id="3" name="Content Placeholder 2"/>
@@ -14366,8 +14342,8 @@
           </a:p>
         </p:txBody>
       </p:sp>
-      <mc:AlternateContent xmlns:mc="http://schemas.openxmlformats.org/markup-compatibility/2006">
-        <mc:Choice xmlns:a14="http://schemas.microsoft.com/office/drawing/2010/main" Requires="a14">
+      <mc:AlternateContent xmlns:mc="http://schemas.openxmlformats.org/markup-compatibility/2006" xmlns:a14="http://schemas.microsoft.com/office/drawing/2010/main">
+        <mc:Choice Requires="a14">
           <p:sp>
             <p:nvSpPr>
               <p:cNvPr id="3" name="Content Placeholder 2">
@@ -15225,7 +15201,7 @@
             </p:txBody>
           </p:sp>
         </mc:Choice>
-        <mc:Fallback>
+        <mc:Fallback xmlns="">
           <p:sp>
             <p:nvSpPr>
               <p:cNvPr id="3" name="Content Placeholder 2">
@@ -15346,8 +15322,8 @@
           </a:p>
         </p:txBody>
       </p:sp>
-      <mc:AlternateContent xmlns:mc="http://schemas.openxmlformats.org/markup-compatibility/2006">
-        <mc:Choice xmlns:a14="http://schemas.microsoft.com/office/drawing/2010/main" Requires="a14">
+      <mc:AlternateContent xmlns:mc="http://schemas.openxmlformats.org/markup-compatibility/2006" xmlns:a14="http://schemas.microsoft.com/office/drawing/2010/main">
+        <mc:Choice Requires="a14">
           <p:sp>
             <p:nvSpPr>
               <p:cNvPr id="3" name="Content Placeholder 2"/>
@@ -16788,13 +16764,7 @@
                           <a:rPr lang="en-US" i="1">
                             <a:latin typeface="Cambria Math" panose="02040503050406030204" pitchFamily="18" charset="0"/>
                           </a:rPr>
-                          <m:t>𝑥</m:t>
-                        </m:r>
-                        <m:r>
-                          <a:rPr lang="en-US" i="1">
-                            <a:latin typeface="Cambria Math" panose="02040503050406030204" pitchFamily="18" charset="0"/>
-                          </a:rPr>
-                          <m:t>𝑦</m:t>
+                          <m:t>𝑥𝑦</m:t>
                         </m:r>
                       </m:sub>
                     </m:sSub>
@@ -16967,7 +16937,7 @@
             </p:txBody>
           </p:sp>
         </mc:Choice>
-        <mc:Fallback>
+        <mc:Fallback xmlns="">
           <p:sp>
             <p:nvSpPr>
               <p:cNvPr id="3" name="Content Placeholder 2"/>

</xml_diff>